<commit_message>
update 03 & 05
</commit_message>
<xml_diff>
--- a/PPTs/03.深入DX12绘制一.pptx
+++ b/PPTs/03.深入DX12绘制一.pptx
@@ -270,7 +270,7 @@
           <a:p>
             <a:fld id="{0C0E42BC-8A47-448F-A68A-F4ACF20E9984}" type="datetimeFigureOut">
               <a:rPr lang="en-US" smtClean="0"/>
-              <a:t>12/28/2021</a:t>
+              <a:t>12/29/2021</a:t>
             </a:fld>
             <a:endParaRPr lang="zh-CN"/>
           </a:p>
@@ -5161,11 +5161,7 @@
             </a:r>
             <a:r>
               <a:rPr lang="zh-CN" altLang="en-US" dirty="0" smtClean="0"/>
-              <a:t>的示例</a:t>
-            </a:r>
-            <a:r>
-              <a:rPr lang="zh-CN" altLang="en-US" dirty="0" smtClean="0"/>
-              <a:t>解释，</a:t>
+              <a:t>的示例解释，</a:t>
             </a:r>
             <a:endParaRPr lang="en-US" altLang="zh-CN" dirty="0" smtClean="0"/>
           </a:p>
@@ -15123,6 +15119,168 @@
               <a:solidFill>
                 <a:srgbClr val="000000"/>
               </a:solidFill>
+              <a:sym typeface="Helvetica Light"/>
+            </a:endParaRPr>
+          </a:p>
+        </p:txBody>
+      </p:sp>
+      <p:sp>
+        <p:nvSpPr>
+          <p:cNvPr id="2" name="文本框 1"/>
+          <p:cNvSpPr txBox="1"/>
+          <p:nvPr/>
+        </p:nvSpPr>
+        <p:spPr>
+          <a:xfrm>
+            <a:off x="15311544" y="7542213"/>
+            <a:ext cx="7186506" cy="1641475"/>
+          </a:xfrm>
+          <a:prstGeom prst="rect">
+            <a:avLst/>
+          </a:prstGeom>
+          <a:noFill/>
+          <a:ln w="12700" cap="flat">
+            <a:noFill/>
+            <a:miter lim="400000"/>
+          </a:ln>
+        </p:spPr>
+        <p:style>
+          <a:lnRef idx="0">
+            <a:scrgbClr r="0" g="0" b="0"/>
+          </a:lnRef>
+          <a:fillRef idx="0">
+            <a:scrgbClr r="0" g="0" b="0"/>
+          </a:fillRef>
+          <a:effectRef idx="0">
+            <a:scrgbClr r="0" g="0" b="0"/>
+          </a:effectRef>
+          <a:fontRef idx="none"/>
+        </p:style>
+        <p:txBody>
+          <a:bodyPr rot="0" spcFirstLastPara="1" vertOverflow="overflow" horzOverflow="overflow" vert="horz" wrap="square" lIns="50800" tIns="50800" rIns="50800" bIns="50800" numCol="1" spcCol="38100" rtlCol="0" anchor="ctr">
+            <a:spAutoFit/>
+          </a:bodyPr>
+          <a:lstStyle/>
+          <a:p>
+            <a:pPr marL="0" marR="0" indent="0" defTabSz="825500" rtl="0" fontAlgn="auto" latinLnBrk="0" hangingPunct="0">
+              <a:lnSpc>
+                <a:spcPct val="100000"/>
+              </a:lnSpc>
+              <a:spcBef>
+                <a:spcPts val="0"/>
+              </a:spcBef>
+              <a:spcAft>
+                <a:spcPts val="0"/>
+              </a:spcAft>
+              <a:buClrTx/>
+              <a:buSzTx/>
+              <a:buFontTx/>
+              <a:buNone/>
+            </a:pPr>
+            <a:r>
+              <a:rPr kumimoji="0" lang="en-US" altLang="zh-CN" sz="5000" b="0" i="0" u="none" strike="noStrike" cap="none" spc="0" normalizeH="0" baseline="0" dirty="0" smtClean="0">
+                <a:ln>
+                  <a:noFill/>
+                </a:ln>
+                <a:solidFill>
+                  <a:srgbClr val="000000"/>
+                </a:solidFill>
+                <a:effectLst/>
+                <a:uFillTx/>
+                <a:latin typeface="+mn-lt"/>
+                <a:ea typeface="+mn-ea"/>
+                <a:cs typeface="+mn-cs"/>
+                <a:sym typeface="Helvetica Light"/>
+              </a:rPr>
+              <a:t>1.</a:t>
+            </a:r>
+            <a:r>
+              <a:rPr kumimoji="0" lang="zh-CN" altLang="en-US" sz="5000" b="0" i="0" u="none" strike="noStrike" cap="none" spc="0" normalizeH="0" baseline="0" dirty="0" smtClean="0">
+                <a:ln>
+                  <a:noFill/>
+                </a:ln>
+                <a:solidFill>
+                  <a:srgbClr val="000000"/>
+                </a:solidFill>
+                <a:effectLst/>
+                <a:uFillTx/>
+                <a:latin typeface="+mn-lt"/>
+                <a:ea typeface="+mn-ea"/>
+                <a:cs typeface="+mn-cs"/>
+                <a:sym typeface="Helvetica Light"/>
+              </a:rPr>
+              <a:t>标题改成雅黑</a:t>
+            </a:r>
+            <a:endParaRPr kumimoji="0" lang="en-US" altLang="zh-CN" sz="5000" b="0" i="0" u="none" strike="noStrike" cap="none" spc="0" normalizeH="0" baseline="0" dirty="0" smtClean="0">
+              <a:ln>
+                <a:noFill/>
+              </a:ln>
+              <a:solidFill>
+                <a:srgbClr val="000000"/>
+              </a:solidFill>
+              <a:effectLst/>
+              <a:uFillTx/>
+              <a:latin typeface="+mn-lt"/>
+              <a:ea typeface="+mn-ea"/>
+              <a:cs typeface="+mn-cs"/>
+              <a:sym typeface="Helvetica Light"/>
+            </a:endParaRPr>
+          </a:p>
+          <a:p>
+            <a:pPr marL="0" marR="0" indent="0" defTabSz="825500" rtl="0" fontAlgn="auto" latinLnBrk="0" hangingPunct="0">
+              <a:lnSpc>
+                <a:spcPct val="100000"/>
+              </a:lnSpc>
+              <a:spcBef>
+                <a:spcPts val="0"/>
+              </a:spcBef>
+              <a:spcAft>
+                <a:spcPts val="0"/>
+              </a:spcAft>
+              <a:buClrTx/>
+              <a:buSzTx/>
+              <a:buFontTx/>
+              <a:buNone/>
+            </a:pPr>
+            <a:r>
+              <a:rPr lang="en-US" altLang="zh-CN" sz="5000" dirty="0" smtClean="0">
+                <a:solidFill>
+                  <a:srgbClr val="000000"/>
+                </a:solidFill>
+                <a:sym typeface="Helvetica Light"/>
+              </a:rPr>
+              <a:t>2.</a:t>
+            </a:r>
+            <a:r>
+              <a:rPr lang="zh-CN" altLang="en-US" sz="5000" dirty="0" smtClean="0">
+                <a:solidFill>
+                  <a:srgbClr val="000000"/>
+                </a:solidFill>
+                <a:sym typeface="Helvetica Light"/>
+              </a:rPr>
+              <a:t>内容改成雅黑</a:t>
+            </a:r>
+            <a:r>
+              <a:rPr lang="en-US" altLang="zh-CN" sz="5000" dirty="0" smtClean="0">
+                <a:solidFill>
+                  <a:srgbClr val="000000"/>
+                </a:solidFill>
+                <a:sym typeface="Helvetica Light"/>
+              </a:rPr>
+              <a:t>light</a:t>
+            </a:r>
+            <a:endParaRPr kumimoji="0" lang="zh-CN" altLang="en-US" sz="5000" b="0" i="0" u="none" strike="noStrike" cap="none" spc="0" normalizeH="0" baseline="0" dirty="0">
+              <a:ln>
+                <a:noFill/>
+              </a:ln>
+              <a:solidFill>
+                <a:srgbClr val="000000"/>
+              </a:solidFill>
+              <a:effectLst/>
+              <a:uFillTx/>
+              <a:latin typeface="+mn-lt"/>
+              <a:ea typeface="+mn-ea"/>
+              <a:cs typeface="+mn-cs"/>
               <a:sym typeface="Helvetica Light"/>
             </a:endParaRPr>
           </a:p>

</xml_diff>